<commit_message>
moved some files to the answer directory
</commit_message>
<xml_diff>
--- a/Spark Mlib.pptx
+++ b/Spark Mlib.pptx
@@ -140,7 +140,7 @@
   </p:defaultTextStyle>
   <p:extLst>
     <p:ext uri="{EFAFB233-063F-42B5-8137-9DF3F51BA10A}">
-      <p15:sldGuideLst xmlns:p15="http://schemas.microsoft.com/office/powerpoint/2012/main" xmlns="">
+      <p15:sldGuideLst xmlns="" xmlns:p15="http://schemas.microsoft.com/office/powerpoint/2012/main">
         <p15:guide id="1" orient="horz" pos="2341" userDrawn="1">
           <p15:clr>
             <a:srgbClr val="A4A3A4"/>
@@ -204,7 +204,7 @@
       </p15:sldGuideLst>
     </p:ext>
     <p:ext uri="{2D200454-40CA-4A62-9FC3-DE9A4176ACB9}">
-      <p15:notesGuideLst xmlns:p15="http://schemas.microsoft.com/office/powerpoint/2012/main" xmlns="">
+      <p15:notesGuideLst xmlns="" xmlns:p15="http://schemas.microsoft.com/office/powerpoint/2012/main">
         <p15:guide id="1" orient="horz" pos="2880">
           <p15:clr>
             <a:srgbClr val="A4A3A4"/>
@@ -307,7 +307,7 @@
               <a:rPr lang="en-GB" smtClean="0">
                 <a:latin typeface="ING Me" pitchFamily="2" charset="0"/>
               </a:rPr>
-              <a:t>27/03/2016</a:t>
+              <a:t>28/03/2016</a:t>
             </a:fld>
             <a:endParaRPr lang="en-GB">
               <a:latin typeface="ING Me" pitchFamily="2" charset="0"/>
@@ -446,7 +446,7 @@
             <a:fld id="{B6962210-35F6-42EB-A3B8-FCE6E13B30BA}" type="datetimeFigureOut">
               <a:rPr lang="en-GB" smtClean="0"/>
               <a:pPr/>
-              <a:t>27/03/2016</a:t>
+              <a:t>28/03/2016</a:t>
             </a:fld>
             <a:endParaRPr lang="en-GB"/>
           </a:p>
@@ -3605,7 +3605,7 @@
   </p:timing>
   <p:extLst mod="1">
     <p:ext uri="{DCECCB84-F9BA-43D5-87BE-67443E8EF086}">
-      <p15:sldGuideLst xmlns:p15="http://schemas.microsoft.com/office/powerpoint/2012/main" xmlns="">
+      <p15:sldGuideLst xmlns="" xmlns:p15="http://schemas.microsoft.com/office/powerpoint/2012/main">
         <p15:guide id="1" orient="horz" pos="4135" userDrawn="1">
           <p15:clr>
             <a:srgbClr val="FBAE40"/>
@@ -5942,7 +5942,7 @@
   </p:timing>
   <p:extLst mod="1">
     <p:ext uri="{DCECCB84-F9BA-43D5-87BE-67443E8EF086}">
-      <p15:sldGuideLst xmlns:p15="http://schemas.microsoft.com/office/powerpoint/2012/main" xmlns="">
+      <p15:sldGuideLst xmlns="" xmlns:p15="http://schemas.microsoft.com/office/powerpoint/2012/main">
         <p15:guide id="1" orient="horz" pos="4135">
           <p15:clr>
             <a:srgbClr val="FBAE40"/>
@@ -8261,7 +8261,7 @@
   </p:timing>
   <p:extLst mod="1">
     <p:ext uri="{DCECCB84-F9BA-43D5-87BE-67443E8EF086}">
-      <p15:sldGuideLst xmlns:p15="http://schemas.microsoft.com/office/powerpoint/2012/main" xmlns="">
+      <p15:sldGuideLst xmlns="" xmlns:p15="http://schemas.microsoft.com/office/powerpoint/2012/main">
         <p15:guide id="1" orient="horz" pos="4135">
           <p15:clr>
             <a:srgbClr val="FBAE40"/>
@@ -10787,7 +10787,7 @@
   </p:timing>
   <p:extLst mod="1">
     <p:ext uri="{DCECCB84-F9BA-43D5-87BE-67443E8EF086}">
-      <p15:sldGuideLst xmlns:p15="http://schemas.microsoft.com/office/powerpoint/2012/main" xmlns="">
+      <p15:sldGuideLst xmlns="" xmlns:p15="http://schemas.microsoft.com/office/powerpoint/2012/main">
         <p15:guide id="1" orient="horz" pos="4135">
           <p15:clr>
             <a:srgbClr val="FBAE40"/>
@@ -11876,7 +11876,7 @@
   </p:timing>
   <p:extLst mod="1">
     <p:ext uri="{DCECCB84-F9BA-43D5-87BE-67443E8EF086}">
-      <p15:sldGuideLst xmlns:p15="http://schemas.microsoft.com/office/powerpoint/2012/main" xmlns=""/>
+      <p15:sldGuideLst xmlns="" xmlns:p15="http://schemas.microsoft.com/office/powerpoint/2012/main"/>
     </p:ext>
   </p:extLst>
 </p:sldLayout>
@@ -13469,7 +13469,7 @@
   </p:timing>
   <p:extLst mod="1">
     <p:ext uri="{DCECCB84-F9BA-43D5-87BE-67443E8EF086}">
-      <p15:sldGuideLst xmlns:p15="http://schemas.microsoft.com/office/powerpoint/2012/main" xmlns="">
+      <p15:sldGuideLst xmlns="" xmlns:p15="http://schemas.microsoft.com/office/powerpoint/2012/main">
         <p15:guide id="1" pos="4308" userDrawn="1">
           <p15:clr>
             <a:srgbClr val="FBAE40"/>
@@ -17904,7 +17904,7 @@
   </p:timing>
   <p:extLst mod="1">
     <p:ext uri="{DCECCB84-F9BA-43D5-87BE-67443E8EF086}">
-      <p15:sldGuideLst xmlns:p15="http://schemas.microsoft.com/office/powerpoint/2012/main" xmlns="">
+      <p15:sldGuideLst xmlns="" xmlns:p15="http://schemas.microsoft.com/office/powerpoint/2012/main">
         <p15:guide id="1" pos="302" userDrawn="1">
           <p15:clr>
             <a:srgbClr val="FBAE40"/>
@@ -18125,7 +18125,7 @@
   </p:timing>
   <p:extLst mod="1">
     <p:ext uri="{DCECCB84-F9BA-43D5-87BE-67443E8EF086}">
-      <p15:sldGuideLst xmlns:p15="http://schemas.microsoft.com/office/powerpoint/2012/main" xmlns="">
+      <p15:sldGuideLst xmlns="" xmlns:p15="http://schemas.microsoft.com/office/powerpoint/2012/main">
         <p15:guide id="1" pos="3720" userDrawn="1">
           <p15:clr>
             <a:srgbClr val="FBAE40"/>
@@ -18433,7 +18433,7 @@
   </p:timing>
   <p:extLst mod="1">
     <p:ext uri="{DCECCB84-F9BA-43D5-87BE-67443E8EF086}">
-      <p15:sldGuideLst xmlns:p15="http://schemas.microsoft.com/office/powerpoint/2012/main" xmlns="">
+      <p15:sldGuideLst xmlns="" xmlns:p15="http://schemas.microsoft.com/office/powerpoint/2012/main">
         <p15:guide id="1" pos="3720">
           <p15:clr>
             <a:srgbClr val="FBAE40"/>
@@ -18700,7 +18700,7 @@
   </p:timing>
   <p:extLst mod="1">
     <p:ext uri="{DCECCB84-F9BA-43D5-87BE-67443E8EF086}">
-      <p15:sldGuideLst xmlns:p15="http://schemas.microsoft.com/office/powerpoint/2012/main" xmlns="">
+      <p15:sldGuideLst xmlns="" xmlns:p15="http://schemas.microsoft.com/office/powerpoint/2012/main">
         <p15:guide id="1" pos="3720">
           <p15:clr>
             <a:srgbClr val="FBAE40"/>
@@ -19140,7 +19140,7 @@
   </p:timing>
   <p:extLst mod="1">
     <p:ext uri="{DCECCB84-F9BA-43D5-87BE-67443E8EF086}">
-      <p15:sldGuideLst xmlns:p15="http://schemas.microsoft.com/office/powerpoint/2012/main" xmlns="">
+      <p15:sldGuideLst xmlns="" xmlns:p15="http://schemas.microsoft.com/office/powerpoint/2012/main">
         <p15:guide id="1" pos="3720">
           <p15:clr>
             <a:srgbClr val="FBAE40"/>
@@ -19492,7 +19492,7 @@
   </p:timing>
   <p:extLst mod="1">
     <p:ext uri="{DCECCB84-F9BA-43D5-87BE-67443E8EF086}">
-      <p15:sldGuideLst xmlns:p15="http://schemas.microsoft.com/office/powerpoint/2012/main" xmlns="">
+      <p15:sldGuideLst xmlns="" xmlns:p15="http://schemas.microsoft.com/office/powerpoint/2012/main">
         <p15:guide id="1" pos="3720" userDrawn="1">
           <p15:clr>
             <a:srgbClr val="FBAE40"/>
@@ -19883,7 +19883,7 @@
   </p:timing>
   <p:extLst mod="1">
     <p:ext uri="{DCECCB84-F9BA-43D5-87BE-67443E8EF086}">
-      <p15:sldGuideLst xmlns:p15="http://schemas.microsoft.com/office/powerpoint/2012/main" xmlns="">
+      <p15:sldGuideLst xmlns="" xmlns:p15="http://schemas.microsoft.com/office/powerpoint/2012/main">
         <p15:guide id="1" pos="2591" userDrawn="1">
           <p15:clr>
             <a:srgbClr val="FBAE40"/>
@@ -20405,7 +20405,7 @@
   </p:timing>
   <p:extLst mod="1">
     <p:ext uri="{DCECCB84-F9BA-43D5-87BE-67443E8EF086}">
-      <p15:sldGuideLst xmlns:p15="http://schemas.microsoft.com/office/powerpoint/2012/main" xmlns="">
+      <p15:sldGuideLst xmlns="" xmlns:p15="http://schemas.microsoft.com/office/powerpoint/2012/main">
         <p15:guide id="2" pos="2808">
           <p15:clr>
             <a:srgbClr val="FBAE40"/>
@@ -20967,7 +20967,7 @@
   </p:timing>
   <p:extLst mod="1">
     <p:ext uri="{DCECCB84-F9BA-43D5-87BE-67443E8EF086}">
-      <p15:sldGuideLst xmlns:p15="http://schemas.microsoft.com/office/powerpoint/2012/main" xmlns="">
+      <p15:sldGuideLst xmlns="" xmlns:p15="http://schemas.microsoft.com/office/powerpoint/2012/main">
         <p15:guide id="2" pos="3720" userDrawn="1">
           <p15:clr>
             <a:srgbClr val="FBAE40"/>
@@ -21717,7 +21717,7 @@
   </p:timing>
   <p:extLst mod="1">
     <p:ext uri="{DCECCB84-F9BA-43D5-87BE-67443E8EF086}">
-      <p15:sldGuideLst xmlns:p15="http://schemas.microsoft.com/office/powerpoint/2012/main" xmlns="">
+      <p15:sldGuideLst xmlns="" xmlns:p15="http://schemas.microsoft.com/office/powerpoint/2012/main">
         <p15:guide id="2" pos="2592" userDrawn="1">
           <p15:clr>
             <a:srgbClr val="FBAE40"/>
@@ -22690,7 +22690,7 @@
   </p:timing>
   <p:extLst mod="1">
     <p:ext uri="{DCECCB84-F9BA-43D5-87BE-67443E8EF086}">
-      <p15:sldGuideLst xmlns:p15="http://schemas.microsoft.com/office/powerpoint/2012/main" xmlns="">
+      <p15:sldGuideLst xmlns="" xmlns:p15="http://schemas.microsoft.com/office/powerpoint/2012/main">
         <p15:guide id="2" pos="2149" userDrawn="1">
           <p15:clr>
             <a:srgbClr val="FBAE40"/>
@@ -23899,7 +23899,7 @@
   </p:timing>
   <p:extLst mod="1">
     <p:ext uri="{DCECCB84-F9BA-43D5-87BE-67443E8EF086}">
-      <p15:sldGuideLst xmlns:p15="http://schemas.microsoft.com/office/powerpoint/2012/main" xmlns="">
+      <p15:sldGuideLst xmlns="" xmlns:p15="http://schemas.microsoft.com/office/powerpoint/2012/main">
         <p15:guide id="1" pos="2854" userDrawn="1">
           <p15:clr>
             <a:srgbClr val="FBAE40"/>
@@ -25002,7 +25002,7 @@
   </p:timing>
   <p:extLst mod="1">
     <p:ext uri="{DCECCB84-F9BA-43D5-87BE-67443E8EF086}">
-      <p15:sldGuideLst xmlns:p15="http://schemas.microsoft.com/office/powerpoint/2012/main" xmlns="">
+      <p15:sldGuideLst xmlns="" xmlns:p15="http://schemas.microsoft.com/office/powerpoint/2012/main">
         <p15:guide id="1" pos="4806" userDrawn="1">
           <p15:clr>
             <a:srgbClr val="FBAE40"/>
@@ -27160,7 +27160,7 @@
   </p:timing>
   <p:extLst mod="1">
     <p:ext uri="{DCECCB84-F9BA-43D5-87BE-67443E8EF086}">
-      <p15:sldGuideLst xmlns:p15="http://schemas.microsoft.com/office/powerpoint/2012/main" xmlns="">
+      <p15:sldGuideLst xmlns="" xmlns:p15="http://schemas.microsoft.com/office/powerpoint/2012/main">
         <p15:guide id="1" pos="302">
           <p15:clr>
             <a:srgbClr val="FBAE40"/>
@@ -29681,7 +29681,7 @@
   </p:timing>
   <p:extLst mod="1">
     <p:ext uri="{DCECCB84-F9BA-43D5-87BE-67443E8EF086}">
-      <p15:sldGuideLst xmlns:p15="http://schemas.microsoft.com/office/powerpoint/2012/main" xmlns="">
+      <p15:sldGuideLst xmlns="" xmlns:p15="http://schemas.microsoft.com/office/powerpoint/2012/main">
         <p15:guide id="1" pos="3720" userDrawn="1">
           <p15:clr>
             <a:srgbClr val="FBAE40"/>
@@ -34451,7 +34451,7 @@
   </p:timing>
   <p:extLst mod="1">
     <p:ext uri="{DCECCB84-F9BA-43D5-87BE-67443E8EF086}">
-      <p15:sldGuideLst xmlns:p15="http://schemas.microsoft.com/office/powerpoint/2012/main" xmlns="">
+      <p15:sldGuideLst xmlns="" xmlns:p15="http://schemas.microsoft.com/office/powerpoint/2012/main">
         <p15:guide id="1" orient="horz" pos="4135" userDrawn="1">
           <p15:clr>
             <a:srgbClr val="FBAE40"/>
@@ -37048,7 +37048,7 @@
   </p:timing>
   <p:extLst mod="1">
     <p:ext uri="{DCECCB84-F9BA-43D5-87BE-67443E8EF086}">
-      <p15:sldGuideLst xmlns:p15="http://schemas.microsoft.com/office/powerpoint/2012/main" xmlns="">
+      <p15:sldGuideLst xmlns="" xmlns:p15="http://schemas.microsoft.com/office/powerpoint/2012/main">
         <p15:guide id="1" orient="horz" pos="4135" userDrawn="1">
           <p15:clr>
             <a:srgbClr val="FBAE40"/>
@@ -39789,7 +39789,7 @@
   </p:timing>
   <p:extLst mod="1">
     <p:ext uri="{DCECCB84-F9BA-43D5-87BE-67443E8EF086}">
-      <p15:sldGuideLst xmlns:p15="http://schemas.microsoft.com/office/powerpoint/2012/main" xmlns="">
+      <p15:sldGuideLst xmlns="" xmlns:p15="http://schemas.microsoft.com/office/powerpoint/2012/main">
         <p15:guide id="1" orient="horz" pos="4135" userDrawn="1">
           <p15:clr>
             <a:srgbClr val="FBAE40"/>
@@ -41947,7 +41947,7 @@
   </p:timing>
   <p:extLst mod="1">
     <p:ext uri="{DCECCB84-F9BA-43D5-87BE-67443E8EF086}">
-      <p15:sldGuideLst xmlns:p15="http://schemas.microsoft.com/office/powerpoint/2012/main" xmlns="">
+      <p15:sldGuideLst xmlns="" xmlns:p15="http://schemas.microsoft.com/office/powerpoint/2012/main">
         <p15:guide id="1" orient="horz" pos="4135">
           <p15:clr>
             <a:srgbClr val="FBAE40"/>
@@ -44389,7 +44389,7 @@
   </p:txStyles>
   <p:extLst mod="1">
     <p:ext uri="{27BBF7A9-308A-43DC-89C8-2F10F3537804}">
-      <p15:sldGuideLst xmlns:p15="http://schemas.microsoft.com/office/powerpoint/2012/main" xmlns="">
+      <p15:sldGuideLst xmlns="" xmlns:p15="http://schemas.microsoft.com/office/powerpoint/2012/main">
         <p15:guide id="3" orient="horz" pos="721" userDrawn="1">
           <p15:clr>
             <a:srgbClr val="F26B43"/>
@@ -46776,11 +46776,7 @@
             </a:r>
             <a:r>
               <a:rPr lang="nl-NL" dirty="0"/>
-              <a:t>(1.0, 0.0, 3.0)</a:t>
-            </a:r>
-            <a:r>
-              <a:rPr lang="nl-NL" dirty="0"/>
-              <a:t> </a:t>
+              <a:t>(1.0, 0.0, 3.0) </a:t>
             </a:r>
             <a:endParaRPr lang="nl-NL" dirty="0" smtClean="0"/>
           </a:p>
@@ -46838,11 +46834,7 @@
             <a:pPr lvl="3"/>
             <a:r>
               <a:rPr lang="en-US" dirty="0"/>
-              <a:t>3</a:t>
-            </a:r>
-            <a:r>
-              <a:rPr lang="en-US" dirty="0"/>
-              <a:t> is the size of the vector</a:t>
+              <a:t>3 is the size of the vector</a:t>
             </a:r>
             <a:r>
               <a:rPr lang="en-US" dirty="0" smtClean="0"/>
@@ -46900,7 +46892,6 @@
               <a:rPr lang="nl-NL" dirty="0"/>
               <a:t> vector</a:t>
             </a:r>
-            <a:endParaRPr lang="nl-NL" dirty="0"/>
           </a:p>
         </p:txBody>
       </p:sp>
@@ -47878,15 +47869,7 @@
           <a:p>
             <a:r>
               <a:rPr lang="nl-NL" dirty="0" smtClean="0"/>
-              <a:t>val </a:t>
-            </a:r>
-            <a:r>
-              <a:rPr lang="nl-NL" dirty="0" smtClean="0"/>
-              <a:t>pr2 </a:t>
-            </a:r>
-            <a:r>
-              <a:rPr lang="nl-NL" dirty="0" smtClean="0"/>
-              <a:t>= </a:t>
+              <a:t>val pr2 = </a:t>
             </a:r>
             <a:r>
               <a:rPr lang="nl-NL" dirty="0" err="1" smtClean="0"/>
@@ -48166,7 +48149,6 @@
               <a:rPr lang="nl-NL" dirty="0" smtClean="0"/>
               <a:t> is 1?</a:t>
             </a:r>
-            <a:endParaRPr lang="nl-NL" dirty="0" smtClean="0"/>
           </a:p>
           <a:p>
             <a:pPr marL="879475" lvl="2" indent="-342900">
@@ -48381,8 +48363,12 @@
               <a:buChar char="•"/>
             </a:pPr>
             <a:r>
+              <a:rPr lang="nl-NL" smtClean="0"/>
+              <a:t>Call the </a:t>
+            </a:r>
+            <a:r>
               <a:rPr lang="nl-NL" dirty="0"/>
-              <a:t>Run the ‘</a:t>
+              <a:t>‘</a:t>
             </a:r>
             <a:r>
               <a:rPr lang="nl-NL" dirty="0" err="1"/>
@@ -48393,8 +48379,20 @@
               <a:t>’ </a:t>
             </a:r>
             <a:r>
-              <a:rPr lang="nl-NL" dirty="0" err="1"/>
+              <a:rPr lang="nl-NL" dirty="0" err="1" smtClean="0"/>
               <a:t>method</a:t>
+            </a:r>
+            <a:r>
+              <a:rPr lang="nl-NL" dirty="0" smtClean="0"/>
+              <a:t> </a:t>
+            </a:r>
+            <a:r>
+              <a:rPr lang="nl-NL" dirty="0" err="1" smtClean="0"/>
+              <a:t>to</a:t>
+            </a:r>
+            <a:r>
+              <a:rPr lang="nl-NL" dirty="0" smtClean="0"/>
+              <a:t> test the model</a:t>
             </a:r>
             <a:endParaRPr lang="nl-NL" dirty="0"/>
           </a:p>
@@ -50778,8 +50776,8 @@
               <a:t>// Print the </a:t>
             </a:r>
             <a:r>
-              <a:rPr lang="nl-NL" sz="1800" b="1" dirty="0" err="1" smtClean="0"/>
-              <a:t>paris</a:t>
+              <a:rPr lang="nl-NL" sz="1800" b="1" dirty="0" smtClean="0"/>
+              <a:t>pairs</a:t>
             </a:r>
             <a:endParaRPr lang="nl-NL" sz="1800" b="1" dirty="0" smtClean="0"/>
           </a:p>
@@ -50813,7 +50811,6 @@
               <a:rPr lang="nl-NL" sz="1800" b="1" dirty="0"/>
               <a:t>)</a:t>
             </a:r>
-            <a:endParaRPr lang="nl-NL" sz="1800" b="1" dirty="0"/>
           </a:p>
         </p:txBody>
       </p:sp>
@@ -51178,7 +51175,7 @@
   <a:extraClrSchemeLst/>
   <a:extLst>
     <a:ext uri="{05A4C25C-085E-4340-85A3-A5531E510DB2}">
-      <thm15:themeFamily xmlns:thm15="http://schemas.microsoft.com/office/thememl/2012/main" xmlns="" name="ING_PP_Template_16x9_08042015.potx" id="{6D084BF0-9966-4FDC-A0E8-0296637E5E37}" vid="{40DDC393-4B6B-4664-98B0-883141C8FD4C}"/>
+      <thm15:themeFamily xmlns="" xmlns:thm15="http://schemas.microsoft.com/office/thememl/2012/main" name="ING_PP_Template_16x9_08042015.potx" id="{6D084BF0-9966-4FDC-A0E8-0296637E5E37}" vid="{40DDC393-4B6B-4664-98B0-883141C8FD4C}"/>
     </a:ext>
   </a:extLst>
 </a:theme>
@@ -51379,7 +51376,7 @@
   <a:extraClrSchemeLst/>
   <a:extLst>
     <a:ext uri="{05A4C25C-085E-4340-85A3-A5531E510DB2}">
-      <thm15:themeFamily xmlns:thm15="http://schemas.microsoft.com/office/thememl/2012/main" xmlns="" name="Office Theme" id="{62F939B6-93AF-4DB8-9C6B-D6C7DFDC589F}" vid="{4A3C46E8-61CC-4603-A589-7422A47A8E4A}"/>
+      <thm15:themeFamily xmlns="" xmlns:thm15="http://schemas.microsoft.com/office/thememl/2012/main" name="Office Theme" id="{62F939B6-93AF-4DB8-9C6B-D6C7DFDC589F}" vid="{4A3C46E8-61CC-4603-A589-7422A47A8E4A}"/>
     </a:ext>
   </a:extLst>
 </a:theme>
@@ -51640,13 +51637,31 @@
   <a:extraClrSchemeLst/>
   <a:extLst>
     <a:ext uri="{05A4C25C-085E-4340-85A3-A5531E510DB2}">
-      <thm15:themeFamily xmlns:thm15="http://schemas.microsoft.com/office/thememl/2012/main" xmlns="" name="Office Theme" id="{62F939B6-93AF-4DB8-9C6B-D6C7DFDC589F}" vid="{4A3C46E8-61CC-4603-A589-7422A47A8E4A}"/>
+      <thm15:themeFamily xmlns="" xmlns:thm15="http://schemas.microsoft.com/office/thememl/2012/main" name="Office Theme" id="{62F939B6-93AF-4DB8-9C6B-D6C7DFDC589F}" vid="{4A3C46E8-61CC-4603-A589-7422A47A8E4A}"/>
     </a:ext>
   </a:extLst>
 </a:theme>
 </file>
 
 <file path=customXml/item1.xml><?xml version="1.0" encoding="utf-8"?>
+<p:properties xmlns:p="http://schemas.microsoft.com/office/2006/metadata/properties" xmlns:xsi="http://www.w3.org/2001/XMLSchema-instance" xmlns:pc="http://schemas.microsoft.com/office/infopath/2007/PartnerControls">
+  <documentManagement>
+    <PublishingExpirationDate xmlns="http://schemas.microsoft.com/sharepoint/v3" xsi:nil="true"/>
+    <PublishingStartDate xmlns="http://schemas.microsoft.com/sharepoint/v3" xsi:nil="true"/>
+  </documentManagement>
+</p:properties>
+</file>
+
+<file path=customXml/item2.xml><?xml version="1.0" encoding="utf-8"?>
+<?mso-contentType ?>
+<FormTemplates xmlns="http://schemas.microsoft.com/sharepoint/v3/contenttype/forms">
+  <Display>DocumentLibraryForm</Display>
+  <Edit>DocumentLibraryForm</Edit>
+  <New>DocumentLibraryForm</New>
+</FormTemplates>
+</file>
+
+<file path=customXml/item3.xml><?xml version="1.0" encoding="utf-8"?>
 <ct:contentTypeSchema xmlns:ct="http://schemas.microsoft.com/office/2006/metadata/contentType" xmlns:ma="http://schemas.microsoft.com/office/2006/metadata/properties/metaAttributes" ct:_="" ma:_="" ma:contentTypeName="Document" ma:contentTypeID="0x0101008B945356526C2B43A2CE667CA8BF87BF" ma:contentTypeVersion="1" ma:contentTypeDescription="Create a new document." ma:contentTypeScope="" ma:versionID="fee854732b468a7a1ce22056fc36b7a7">
   <xsd:schema xmlns:xsd="http://www.w3.org/2001/XMLSchema" xmlns:xs="http://www.w3.org/2001/XMLSchema" xmlns:p="http://schemas.microsoft.com/office/2006/metadata/properties" xmlns:ns1="http://schemas.microsoft.com/sharepoint/v3" targetNamespace="http://schemas.microsoft.com/office/2006/metadata/properties" ma:root="true" ma:fieldsID="a447206dab0015f8b9f8924535193e8c" ns1:_="">
     <xsd:import namespace="http://schemas.microsoft.com/sharepoint/v3"/>
@@ -51778,25 +51793,31 @@
 </ct:contentTypeSchema>
 </file>
 
-<file path=customXml/item2.xml><?xml version="1.0" encoding="utf-8"?>
-<?mso-contentType ?>
-<FormTemplates xmlns="http://schemas.microsoft.com/sharepoint/v3/contenttype/forms">
-  <Display>DocumentLibraryForm</Display>
-  <Edit>DocumentLibraryForm</Edit>
-  <New>DocumentLibraryForm</New>
-</FormTemplates>
+<file path=customXml/itemProps1.xml><?xml version="1.0" encoding="utf-8"?>
+<ds:datastoreItem xmlns:ds="http://schemas.openxmlformats.org/officeDocument/2006/customXml" ds:itemID="{67462F1F-9F53-4B77-A7FE-12F262875427}">
+  <ds:schemaRefs>
+    <ds:schemaRef ds:uri="http://purl.org/dc/elements/1.1/"/>
+    <ds:schemaRef ds:uri="http://schemas.openxmlformats.org/package/2006/metadata/core-properties"/>
+    <ds:schemaRef ds:uri="http://purl.org/dc/dcmitype/"/>
+    <ds:schemaRef ds:uri="http://schemas.microsoft.com/office/2006/metadata/properties"/>
+    <ds:schemaRef ds:uri="http://schemas.microsoft.com/office/2006/documentManagement/types"/>
+    <ds:schemaRef ds:uri="http://www.w3.org/XML/1998/namespace"/>
+    <ds:schemaRef ds:uri="http://schemas.microsoft.com/office/infopath/2007/PartnerControls"/>
+    <ds:schemaRef ds:uri="http://schemas.microsoft.com/sharepoint/v3"/>
+    <ds:schemaRef ds:uri="http://purl.org/dc/terms/"/>
+  </ds:schemaRefs>
+</ds:datastoreItem>
 </file>
 
-<file path=customXml/item3.xml><?xml version="1.0" encoding="utf-8"?>
-<p:properties xmlns:p="http://schemas.microsoft.com/office/2006/metadata/properties" xmlns:xsi="http://www.w3.org/2001/XMLSchema-instance" xmlns:pc="http://schemas.microsoft.com/office/infopath/2007/PartnerControls">
-  <documentManagement>
-    <PublishingExpirationDate xmlns="http://schemas.microsoft.com/sharepoint/v3" xsi:nil="true"/>
-    <PublishingStartDate xmlns="http://schemas.microsoft.com/sharepoint/v3" xsi:nil="true"/>
-  </documentManagement>
-</p:properties>
+<file path=customXml/itemProps2.xml><?xml version="1.0" encoding="utf-8"?>
+<ds:datastoreItem xmlns:ds="http://schemas.openxmlformats.org/officeDocument/2006/customXml" ds:itemID="{7CCD96B9-0D16-430F-823E-BAB6E4D6B9F9}">
+  <ds:schemaRefs>
+    <ds:schemaRef ds:uri="http://schemas.microsoft.com/sharepoint/v3/contenttype/forms"/>
+  </ds:schemaRefs>
+</ds:datastoreItem>
 </file>
 
-<file path=customXml/itemProps1.xml><?xml version="1.0" encoding="utf-8"?>
+<file path=customXml/itemProps3.xml><?xml version="1.0" encoding="utf-8"?>
 <ds:datastoreItem xmlns:ds="http://schemas.openxmlformats.org/officeDocument/2006/customXml" ds:itemID="{383F412C-4FC8-41CE-B84A-118208DDB568}">
   <ds:schemaRefs>
     <ds:schemaRef ds:uri="http://schemas.microsoft.com/office/2006/metadata/contentType"/>
@@ -51812,28 +51833,4 @@
     <ds:schemaRef ds:uri="http://schemas.microsoft.com/internal/obd"/>
   </ds:schemaRefs>
 </ds:datastoreItem>
-</file>
-
-<file path=customXml/itemProps2.xml><?xml version="1.0" encoding="utf-8"?>
-<ds:datastoreItem xmlns:ds="http://schemas.openxmlformats.org/officeDocument/2006/customXml" ds:itemID="{7CCD96B9-0D16-430F-823E-BAB6E4D6B9F9}">
-  <ds:schemaRefs>
-    <ds:schemaRef ds:uri="http://schemas.microsoft.com/sharepoint/v3/contenttype/forms"/>
-  </ds:schemaRefs>
-</ds:datastoreItem>
-</file>
-
-<file path=customXml/itemProps3.xml><?xml version="1.0" encoding="utf-8"?>
-<ds:datastoreItem xmlns:ds="http://schemas.openxmlformats.org/officeDocument/2006/customXml" ds:itemID="{67462F1F-9F53-4B77-A7FE-12F262875427}">
-  <ds:schemaRefs>
-    <ds:schemaRef ds:uri="http://purl.org/dc/elements/1.1/"/>
-    <ds:schemaRef ds:uri="http://schemas.openxmlformats.org/package/2006/metadata/core-properties"/>
-    <ds:schemaRef ds:uri="http://purl.org/dc/dcmitype/"/>
-    <ds:schemaRef ds:uri="http://schemas.microsoft.com/office/2006/metadata/properties"/>
-    <ds:schemaRef ds:uri="http://schemas.microsoft.com/office/2006/documentManagement/types"/>
-    <ds:schemaRef ds:uri="http://www.w3.org/XML/1998/namespace"/>
-    <ds:schemaRef ds:uri="http://schemas.microsoft.com/office/infopath/2007/PartnerControls"/>
-    <ds:schemaRef ds:uri="http://schemas.microsoft.com/sharepoint/v3"/>
-    <ds:schemaRef ds:uri="http://purl.org/dc/terms/"/>
-  </ds:schemaRefs>
-</ds:datastoreItem>
 </file>
</xml_diff>